<commit_message>
Update SRS documents and add SystemContextFigure.svg
</commit_message>
<xml_diff>
--- a/docs/SRS/SystemContextFigure.pptx
+++ b/docs/SRS/SystemContextFigure.pptx
@@ -304,7 +304,7 @@
           <a:p>
             <a:fld id="{779256A2-DE0C-7447-B687-786F38514E8C}" type="datetimeFigureOut">
               <a:rPr lang="en-US" smtClean="0"/>
-              <a:t>9/4/19</a:t>
+              <a:t>2/2/2025</a:t>
             </a:fld>
             <a:endParaRPr lang="en-US"/>
           </a:p>
@@ -474,7 +474,7 @@
           <a:p>
             <a:fld id="{779256A2-DE0C-7447-B687-786F38514E8C}" type="datetimeFigureOut">
               <a:rPr lang="en-US" smtClean="0"/>
-              <a:t>9/4/19</a:t>
+              <a:t>2/2/2025</a:t>
             </a:fld>
             <a:endParaRPr lang="en-US"/>
           </a:p>
@@ -654,7 +654,7 @@
           <a:p>
             <a:fld id="{779256A2-DE0C-7447-B687-786F38514E8C}" type="datetimeFigureOut">
               <a:rPr lang="en-US" smtClean="0"/>
-              <a:t>9/4/19</a:t>
+              <a:t>2/2/2025</a:t>
             </a:fld>
             <a:endParaRPr lang="en-US"/>
           </a:p>
@@ -824,7 +824,7 @@
           <a:p>
             <a:fld id="{779256A2-DE0C-7447-B687-786F38514E8C}" type="datetimeFigureOut">
               <a:rPr lang="en-US" smtClean="0"/>
-              <a:t>9/4/19</a:t>
+              <a:t>2/2/2025</a:t>
             </a:fld>
             <a:endParaRPr lang="en-US"/>
           </a:p>
@@ -1070,7 +1070,7 @@
           <a:p>
             <a:fld id="{779256A2-DE0C-7447-B687-786F38514E8C}" type="datetimeFigureOut">
               <a:rPr lang="en-US" smtClean="0"/>
-              <a:t>9/4/19</a:t>
+              <a:t>2/2/2025</a:t>
             </a:fld>
             <a:endParaRPr lang="en-US"/>
           </a:p>
@@ -1358,7 +1358,7 @@
           <a:p>
             <a:fld id="{779256A2-DE0C-7447-B687-786F38514E8C}" type="datetimeFigureOut">
               <a:rPr lang="en-US" smtClean="0"/>
-              <a:t>9/4/19</a:t>
+              <a:t>2/2/2025</a:t>
             </a:fld>
             <a:endParaRPr lang="en-US"/>
           </a:p>
@@ -1780,7 +1780,7 @@
           <a:p>
             <a:fld id="{779256A2-DE0C-7447-B687-786F38514E8C}" type="datetimeFigureOut">
               <a:rPr lang="en-US" smtClean="0"/>
-              <a:t>9/4/19</a:t>
+              <a:t>2/2/2025</a:t>
             </a:fld>
             <a:endParaRPr lang="en-US"/>
           </a:p>
@@ -1898,7 +1898,7 @@
           <a:p>
             <a:fld id="{779256A2-DE0C-7447-B687-786F38514E8C}" type="datetimeFigureOut">
               <a:rPr lang="en-US" smtClean="0"/>
-              <a:t>9/4/19</a:t>
+              <a:t>2/2/2025</a:t>
             </a:fld>
             <a:endParaRPr lang="en-US"/>
           </a:p>
@@ -1993,7 +1993,7 @@
           <a:p>
             <a:fld id="{779256A2-DE0C-7447-B687-786F38514E8C}" type="datetimeFigureOut">
               <a:rPr lang="en-US" smtClean="0"/>
-              <a:t>9/4/19</a:t>
+              <a:t>2/2/2025</a:t>
             </a:fld>
             <a:endParaRPr lang="en-US"/>
           </a:p>
@@ -2270,7 +2270,7 @@
           <a:p>
             <a:fld id="{779256A2-DE0C-7447-B687-786F38514E8C}" type="datetimeFigureOut">
               <a:rPr lang="en-US" smtClean="0"/>
-              <a:t>9/4/19</a:t>
+              <a:t>2/2/2025</a:t>
             </a:fld>
             <a:endParaRPr lang="en-US"/>
           </a:p>
@@ -2523,7 +2523,7 @@
           <a:p>
             <a:fld id="{779256A2-DE0C-7447-B687-786F38514E8C}" type="datetimeFigureOut">
               <a:rPr lang="en-US" smtClean="0"/>
-              <a:t>9/4/19</a:t>
+              <a:t>2/2/2025</a:t>
             </a:fld>
             <a:endParaRPr lang="en-US"/>
           </a:p>
@@ -2736,7 +2736,7 @@
           <a:p>
             <a:fld id="{779256A2-DE0C-7447-B687-786F38514E8C}" type="datetimeFigureOut">
               <a:rPr lang="en-US" smtClean="0"/>
-              <a:t>9/4/19</a:t>
+              <a:t>2/2/2025</a:t>
             </a:fld>
             <a:endParaRPr lang="en-US"/>
           </a:p>
@@ -3333,9 +3333,9 @@
           <p:grpSpPr>
             <a:xfrm>
               <a:off x="3885481" y="3381165"/>
-              <a:ext cx="1523744" cy="1246370"/>
+              <a:ext cx="1483694" cy="1246370"/>
               <a:chOff x="3703297" y="1721177"/>
-              <a:chExt cx="1523744" cy="1246370"/>
+              <a:chExt cx="1483694" cy="1246370"/>
             </a:xfrm>
           </p:grpSpPr>
           <p:sp>
@@ -3395,7 +3395,7 @@
             <p:spPr>
               <a:xfrm>
                 <a:off x="3726309" y="2113529"/>
-                <a:ext cx="1500732" cy="461665"/>
+                <a:ext cx="1435008" cy="461665"/>
               </a:xfrm>
               <a:prstGeom prst="rect">
                 <a:avLst/>
@@ -3409,16 +3409,12 @@
               <a:lstStyle/>
               <a:p>
                 <a:r>
-                  <a:rPr lang="en-US" sz="2400" dirty="0" err="1">
+                  <a:rPr lang="en-US" sz="2400" dirty="0">
                     <a:latin typeface="Times New Roman"/>
                     <a:cs typeface="Times New Roman"/>
                   </a:rPr>
-                  <a:t>ProgName</a:t>
+                  <a:t>2D-RAPP</a:t>
                 </a:r>
-                <a:endParaRPr lang="en-US" sz="2400" dirty="0">
-                  <a:latin typeface="Times New Roman"/>
-                  <a:cs typeface="Times New Roman"/>
-                </a:endParaRPr>
               </a:p>
             </p:txBody>
           </p:sp>
@@ -3509,7 +3505,7 @@
           <p:spPr>
             <a:xfrm>
               <a:off x="1745191" y="3577615"/>
-              <a:ext cx="1114408" cy="369332"/>
+              <a:ext cx="1742785" cy="369332"/>
             </a:xfrm>
             <a:prstGeom prst="rect">
               <a:avLst/>
@@ -3527,7 +3523,7 @@
                   <a:latin typeface="Times New Roman"/>
                   <a:cs typeface="Times New Roman"/>
                 </a:rPr>
-                <a:t>Inputs: …</a:t>
+                <a:t>Input parameters</a:t>
               </a:r>
             </a:p>
           </p:txBody>
@@ -3540,8 +3536,8 @@
           </p:nvSpPr>
           <p:spPr>
             <a:xfrm>
-              <a:off x="5369175" y="3577615"/>
-              <a:ext cx="1268296" cy="369332"/>
+              <a:off x="5369174" y="3681183"/>
+              <a:ext cx="2670537" cy="646331"/>
             </a:xfrm>
             <a:prstGeom prst="rect">
               <a:avLst/>
@@ -3549,7 +3545,7 @@
             <a:noFill/>
           </p:spPr>
           <p:txBody>
-            <a:bodyPr wrap="none" rtlCol="0">
+            <a:bodyPr wrap="square" rtlCol="0">
               <a:spAutoFit/>
             </a:bodyPr>
             <a:lstStyle/>
@@ -3559,7 +3555,16 @@
                   <a:latin typeface="Times New Roman"/>
                   <a:cs typeface="Times New Roman"/>
                 </a:rPr>
-                <a:t>Outputs: …</a:t>
+                <a:t>Joint Angles</a:t>
+              </a:r>
+            </a:p>
+            <a:p>
+              <a:r>
+                <a:rPr lang="en-US" dirty="0">
+                  <a:latin typeface="Times New Roman"/>
+                  <a:cs typeface="Times New Roman"/>
+                </a:rPr>
+                <a:t>End-Effector Trajectory</a:t>
               </a:r>
             </a:p>
           </p:txBody>

</xml_diff>